<commit_message>
Colab links added to presentation
</commit_message>
<xml_diff>
--- a/Object-Oriented Python Slides.pptx
+++ b/Object-Oriented Python Slides.pptx
@@ -5,17 +5,18 @@
     <p:sldMasterId id="2147483648" r:id="rId1"/>
   </p:sldMasterIdLst>
   <p:notesMasterIdLst>
-    <p:notesMasterId r:id="rId7"/>
+    <p:notesMasterId r:id="rId8"/>
   </p:notesMasterIdLst>
   <p:handoutMasterIdLst>
-    <p:handoutMasterId r:id="rId8"/>
+    <p:handoutMasterId r:id="rId9"/>
   </p:handoutMasterIdLst>
   <p:sldIdLst>
     <p:sldId id="264" r:id="rId2"/>
     <p:sldId id="267" r:id="rId3"/>
     <p:sldId id="281" r:id="rId4"/>
-    <p:sldId id="329" r:id="rId5"/>
-    <p:sldId id="280" r:id="rId6"/>
+    <p:sldId id="330" r:id="rId5"/>
+    <p:sldId id="329" r:id="rId6"/>
+    <p:sldId id="280" r:id="rId7"/>
   </p:sldIdLst>
   <p:sldSz cx="9144000" cy="6858000" type="screen4x3"/>
   <p:notesSz cx="7099300" cy="10234613"/>
@@ -122,6 +123,7 @@
             <p14:sldId id="264"/>
             <p14:sldId id="267"/>
             <p14:sldId id="281"/>
+            <p14:sldId id="330"/>
             <p14:sldId id="329"/>
             <p14:sldId id="280"/>
           </p14:sldIdLst>
@@ -398,7 +400,7 @@
           <a:p>
             <a:fld id="{88EB714B-C3CC-4216-88C1-02913905B1CF}" type="datetimeFigureOut">
               <a:rPr lang="en-GB" smtClean="0"/>
-              <a:t>27/10/2020</a:t>
+              <a:t>09/11/2020</a:t>
             </a:fld>
             <a:endParaRPr lang="en-GB"/>
           </a:p>
@@ -1159,7 +1161,7 @@
     </p:spTree>
     <p:extLst>
       <p:ext uri="{BB962C8B-B14F-4D97-AF65-F5344CB8AC3E}">
-        <p14:creationId xmlns:p14="http://schemas.microsoft.com/office/powerpoint/2010/main" val="1492413823"/>
+        <p14:creationId xmlns:p14="http://schemas.microsoft.com/office/powerpoint/2010/main" val="751740247"/>
       </p:ext>
     </p:extLst>
   </p:cSld>
@@ -1188,6 +1190,90 @@
       </p:grpSpPr>
       <p:sp>
         <p:nvSpPr>
+          <p:cNvPr id="2" name="Slide Image Placeholder 1"/>
+          <p:cNvSpPr>
+            <a:spLocks noGrp="1" noRot="1" noChangeAspect="1"/>
+          </p:cNvSpPr>
+          <p:nvPr>
+            <p:ph type="sldImg"/>
+          </p:nvPr>
+        </p:nvSpPr>
+        <p:spPr/>
+      </p:sp>
+      <p:sp>
+        <p:nvSpPr>
+          <p:cNvPr id="3" name="Notes Placeholder 2"/>
+          <p:cNvSpPr>
+            <a:spLocks noGrp="1"/>
+          </p:cNvSpPr>
+          <p:nvPr>
+            <p:ph type="body" idx="1"/>
+          </p:nvPr>
+        </p:nvSpPr>
+        <p:spPr/>
+        <p:txBody>
+          <a:bodyPr/>
+          <a:lstStyle/>
+          <a:p>
+            <a:endParaRPr lang="en-GB" dirty="0"/>
+          </a:p>
+        </p:txBody>
+      </p:sp>
+      <p:sp>
+        <p:nvSpPr>
+          <p:cNvPr id="4" name="Slide Number Placeholder 3"/>
+          <p:cNvSpPr>
+            <a:spLocks noGrp="1"/>
+          </p:cNvSpPr>
+          <p:nvPr>
+            <p:ph type="sldNum" sz="quarter" idx="10"/>
+          </p:nvPr>
+        </p:nvSpPr>
+        <p:spPr/>
+        <p:txBody>
+          <a:bodyPr/>
+          <a:lstStyle/>
+          <a:p>
+            <a:fld id="{6A641EC8-C9F8-4A58-A1A7-F7D817526EEC}" type="slidenum">
+              <a:rPr lang="en-GB" smtClean="0"/>
+              <a:t>5</a:t>
+            </a:fld>
+            <a:endParaRPr lang="en-GB"/>
+          </a:p>
+        </p:txBody>
+      </p:sp>
+    </p:spTree>
+    <p:extLst>
+      <p:ext uri="{BB962C8B-B14F-4D97-AF65-F5344CB8AC3E}">
+        <p14:creationId xmlns:p14="http://schemas.microsoft.com/office/powerpoint/2010/main" val="1492413823"/>
+      </p:ext>
+    </p:extLst>
+  </p:cSld>
+  <p:clrMapOvr>
+    <a:masterClrMapping/>
+  </p:clrMapOvr>
+</p:notes>
+</file>
+
+<file path=ppt/notesSlides/notesSlide6.xml><?xml version="1.0" encoding="utf-8"?>
+<p:notes xmlns:a="http://schemas.openxmlformats.org/drawingml/2006/main" xmlns:r="http://schemas.openxmlformats.org/officeDocument/2006/relationships" xmlns:p="http://schemas.openxmlformats.org/presentationml/2006/main">
+  <p:cSld>
+    <p:spTree>
+      <p:nvGrpSpPr>
+        <p:cNvPr id="1" name=""/>
+        <p:cNvGrpSpPr/>
+        <p:nvPr/>
+      </p:nvGrpSpPr>
+      <p:grpSpPr>
+        <a:xfrm>
+          <a:off x="0" y="0"/>
+          <a:ext cx="0" cy="0"/>
+          <a:chOff x="0" y="0"/>
+          <a:chExt cx="0" cy="0"/>
+        </a:xfrm>
+      </p:grpSpPr>
+      <p:sp>
+        <p:nvSpPr>
           <p:cNvPr id="108546" name="Rectangle 7"/>
           <p:cNvSpPr>
             <a:spLocks noGrp="1" noChangeArrowheads="1"/>
@@ -1346,7 +1432,7 @@
                   <a:spcPct val="0"/>
                 </a:spcBef>
               </a:pPr>
-              <a:t>5</a:t>
+              <a:t>6</a:t>
             </a:fld>
             <a:endParaRPr lang="en-US" altLang="en-US"/>
           </a:p>
@@ -1779,7 +1865,7 @@
           <a:p>
             <a:fld id="{EB0080F8-EA1C-491D-963C-2C881B2F918F}" type="datetimeFigureOut">
               <a:rPr lang="en-GB" smtClean="0"/>
-              <a:t>27/10/2020</a:t>
+              <a:t>09/11/2020</a:t>
             </a:fld>
             <a:endParaRPr lang="en-GB"/>
           </a:p>
@@ -1929,7 +2015,7 @@
           <a:p>
             <a:fld id="{EB0080F8-EA1C-491D-963C-2C881B2F918F}" type="datetimeFigureOut">
               <a:rPr lang="en-GB" smtClean="0"/>
-              <a:t>27/10/2020</a:t>
+              <a:t>09/11/2020</a:t>
             </a:fld>
             <a:endParaRPr lang="en-GB"/>
           </a:p>
@@ -3462,7 +3548,7 @@
           <a:p>
             <a:fld id="{EB0080F8-EA1C-491D-963C-2C881B2F918F}" type="datetimeFigureOut">
               <a:rPr lang="en-GB" smtClean="0"/>
-              <a:t>27/10/2020</a:t>
+              <a:t>09/11/2020</a:t>
             </a:fld>
             <a:endParaRPr lang="en-GB"/>
           </a:p>
@@ -4217,7 +4303,49 @@
           </a:bodyPr>
           <a:lstStyle/>
           <a:p>
-            <a:endParaRPr lang="en-GB" sz="2800" dirty="0"/>
+            <a:r>
+              <a:rPr lang="en-GB" dirty="0">
+                <a:hlinkClick r:id="rId3"/>
+              </a:rPr>
+              <a:t>Types and Objects</a:t>
+            </a:r>
+            <a:endParaRPr lang="en-GB" dirty="0"/>
+          </a:p>
+          <a:p>
+            <a:r>
+              <a:rPr lang="en-GB" dirty="0">
+                <a:hlinkClick r:id="rId4"/>
+              </a:rPr>
+              <a:t>My First Class</a:t>
+            </a:r>
+            <a:endParaRPr lang="en-GB" dirty="0"/>
+          </a:p>
+          <a:p>
+            <a:r>
+              <a:rPr lang="en-GB" dirty="0">
+                <a:hlinkClick r:id="rId5"/>
+              </a:rPr>
+              <a:t>Class Members in Detail</a:t>
+            </a:r>
+            <a:endParaRPr lang="en-GB" dirty="0"/>
+          </a:p>
+          <a:p>
+            <a:r>
+              <a:rPr lang="en-GB" dirty="0">
+                <a:hlinkClick r:id="rId6"/>
+              </a:rPr>
+              <a:t>Magic Methods</a:t>
+            </a:r>
+            <a:endParaRPr lang="en-GB" dirty="0"/>
+          </a:p>
+          <a:p>
+            <a:r>
+              <a:rPr lang="en-GB" dirty="0">
+                <a:hlinkClick r:id="rId7"/>
+              </a:rPr>
+              <a:t>Properties</a:t>
+            </a:r>
+            <a:endParaRPr lang="en-GB" dirty="0"/>
           </a:p>
         </p:txBody>
       </p:sp>
@@ -4276,6 +4404,134 @@
           <a:p>
             <a:r>
               <a:rPr lang="en-GB" sz="4000" dirty="0"/>
+              <a:t>Notebook Links</a:t>
+            </a:r>
+          </a:p>
+        </p:txBody>
+      </p:sp>
+      <p:sp>
+        <p:nvSpPr>
+          <p:cNvPr id="3" name="Content Placeholder 2"/>
+          <p:cNvSpPr>
+            <a:spLocks noGrp="1"/>
+          </p:cNvSpPr>
+          <p:nvPr>
+            <p:ph idx="1"/>
+          </p:nvPr>
+        </p:nvSpPr>
+        <p:spPr>
+          <a:xfrm>
+            <a:off x="457200" y="1600200"/>
+            <a:ext cx="8435280" cy="4876800"/>
+          </a:xfrm>
+        </p:spPr>
+        <p:txBody>
+          <a:bodyPr>
+            <a:normAutofit/>
+          </a:bodyPr>
+          <a:lstStyle/>
+          <a:p>
+            <a:r>
+              <a:rPr lang="en-GB" dirty="0">
+                <a:hlinkClick r:id="rId3"/>
+              </a:rPr>
+              <a:t>Inheritance</a:t>
+            </a:r>
+            <a:endParaRPr lang="en-GB" dirty="0"/>
+          </a:p>
+          <a:p>
+            <a:r>
+              <a:rPr lang="en-GB" dirty="0">
+                <a:hlinkClick r:id="rId4"/>
+              </a:rPr>
+              <a:t>Polymorphism</a:t>
+            </a:r>
+            <a:endParaRPr lang="en-GB" dirty="0"/>
+          </a:p>
+          <a:p>
+            <a:r>
+              <a:rPr lang="en-GB" dirty="0">
+                <a:hlinkClick r:id="rId5"/>
+              </a:rPr>
+              <a:t>Object-Oriented Code Design Principles</a:t>
+            </a:r>
+            <a:endParaRPr lang="en-GB" dirty="0"/>
+          </a:p>
+          <a:p>
+            <a:r>
+              <a:rPr lang="en-GB" dirty="0">
+                <a:hlinkClick r:id="rId6"/>
+              </a:rPr>
+              <a:t>Objects in Objects</a:t>
+            </a:r>
+            <a:endParaRPr lang="en-GB" dirty="0"/>
+          </a:p>
+          <a:p>
+            <a:r>
+              <a:rPr lang="en-GB" dirty="0">
+                <a:hlinkClick r:id="rId7"/>
+              </a:rPr>
+              <a:t>Projects</a:t>
+            </a:r>
+            <a:endParaRPr lang="en-GB" dirty="0"/>
+          </a:p>
+        </p:txBody>
+      </p:sp>
+    </p:spTree>
+    <p:extLst>
+      <p:ext uri="{BB962C8B-B14F-4D97-AF65-F5344CB8AC3E}">
+        <p14:creationId xmlns:p14="http://schemas.microsoft.com/office/powerpoint/2010/main" val="4175751739"/>
+      </p:ext>
+    </p:extLst>
+  </p:cSld>
+  <p:clrMapOvr>
+    <a:masterClrMapping/>
+  </p:clrMapOvr>
+  <mc:AlternateContent xmlns:mc="http://schemas.openxmlformats.org/markup-compatibility/2006">
+    <mc:Choice xmlns:p14="http://schemas.microsoft.com/office/powerpoint/2010/main" Requires="p14">
+      <p:transition p14:dur="10"/>
+    </mc:Choice>
+    <mc:Fallback>
+      <p:transition/>
+    </mc:Fallback>
+  </mc:AlternateContent>
+</p:sld>
+</file>
+
+<file path=ppt/slides/slide5.xml><?xml version="1.0" encoding="utf-8"?>
+<p:sld xmlns:a="http://schemas.openxmlformats.org/drawingml/2006/main" xmlns:r="http://schemas.openxmlformats.org/officeDocument/2006/relationships" xmlns:p="http://schemas.openxmlformats.org/presentationml/2006/main">
+  <p:cSld>
+    <p:spTree>
+      <p:nvGrpSpPr>
+        <p:cNvPr id="1" name=""/>
+        <p:cNvGrpSpPr/>
+        <p:nvPr/>
+      </p:nvGrpSpPr>
+      <p:grpSpPr>
+        <a:xfrm>
+          <a:off x="0" y="0"/>
+          <a:ext cx="0" cy="0"/>
+          <a:chOff x="0" y="0"/>
+          <a:chExt cx="0" cy="0"/>
+        </a:xfrm>
+      </p:grpSpPr>
+      <p:sp>
+        <p:nvSpPr>
+          <p:cNvPr id="2" name="Title 1"/>
+          <p:cNvSpPr>
+            <a:spLocks noGrp="1"/>
+          </p:cNvSpPr>
+          <p:nvPr>
+            <p:ph type="title"/>
+          </p:nvPr>
+        </p:nvSpPr>
+        <p:spPr/>
+        <p:txBody>
+          <a:bodyPr/>
+          <a:lstStyle/>
+          <a:p>
+            <a:r>
+              <a:rPr lang="en-GB" sz="4000" dirty="0"/>
               <a:t>Feedback</a:t>
             </a:r>
           </a:p>
@@ -4366,7 +4622,7 @@
 </p:sld>
 </file>
 
-<file path=ppt/slides/slide5.xml><?xml version="1.0" encoding="utf-8"?>
+<file path=ppt/slides/slide6.xml><?xml version="1.0" encoding="utf-8"?>
 <p:sld xmlns:a="http://schemas.openxmlformats.org/drawingml/2006/main" xmlns:r="http://schemas.openxmlformats.org/officeDocument/2006/relationships" xmlns:p="http://schemas.openxmlformats.org/presentationml/2006/main">
   <p:cSld>
     <p:spTree>

</xml_diff>